<commit_message>
adding updated .html files
</commit_message>
<xml_diff>
--- a/docs/files/GORS Guide to booking an external course v2.0.pptx
+++ b/docs/files/GORS Guide to booking an external course v2.0.pptx
@@ -9416,21 +9416,6 @@
 </file>
 
 <file path=customXml/item1.xml><?xml version="1.0" encoding="utf-8"?>
-<p:properties xmlns:p="http://schemas.microsoft.com/office/2006/metadata/properties" xmlns:xsi="http://www.w3.org/2001/XMLSchema-instance" xmlns:pc="http://schemas.microsoft.com/office/infopath/2007/PartnerControls">
-  <documentManagement/>
-</p:properties>
-</file>
-
-<file path=customXml/item2.xml><?xml version="1.0" encoding="utf-8"?>
-<?mso-contentType ?>
-<FormTemplates xmlns="http://schemas.microsoft.com/sharepoint/v3/contenttype/forms">
-  <Display>DocumentLibraryForm</Display>
-  <Edit>DocumentLibraryForm</Edit>
-  <New>DocumentLibraryForm</New>
-</FormTemplates>
-</file>
-
-<file path=customXml/item3.xml><?xml version="1.0" encoding="utf-8"?>
 <ct:contentTypeSchema xmlns:ct="http://schemas.microsoft.com/office/2006/metadata/contentType" xmlns:ma="http://schemas.microsoft.com/office/2006/metadata/properties/metaAttributes" ct:_="" ma:_="" ma:contentTypeName="Document" ma:contentTypeID="0x01010075C6AE92735478438811BCC21DE5CD44" ma:contentTypeVersion="9" ma:contentTypeDescription="Create a new document." ma:contentTypeScope="" ma:versionID="4464b342bc0c6674cd8437f4b7d40594">
   <xsd:schema xmlns:xsd="http://www.w3.org/2001/XMLSchema" xmlns:xs="http://www.w3.org/2001/XMLSchema" xmlns:p="http://schemas.microsoft.com/office/2006/metadata/properties" xmlns:ns3="734a1c6a-53c2-48e7-a1cc-2e27d2845d4e" targetNamespace="http://schemas.microsoft.com/office/2006/metadata/properties" ma:root="true" ma:fieldsID="14a22371e8bbbad000e662b0b228342a" ns3:_="">
     <xsd:import namespace="734a1c6a-53c2-48e7-a1cc-2e27d2845d4e"/>
@@ -9608,31 +9593,22 @@
 </ct:contentTypeSchema>
 </file>
 
-<file path=customXml/itemProps1.xml><?xml version="1.0" encoding="utf-8"?>
-<ds:datastoreItem xmlns:ds="http://schemas.openxmlformats.org/officeDocument/2006/customXml" ds:itemID="{9FD3942E-F7FA-4AD8-9A69-5FDFB1F490D1}">
-  <ds:schemaRefs>
-    <ds:schemaRef ds:uri="http://purl.org/dc/terms/"/>
-    <ds:schemaRef ds:uri="http://www.w3.org/XML/1998/namespace"/>
-    <ds:schemaRef ds:uri="734a1c6a-53c2-48e7-a1cc-2e27d2845d4e"/>
-    <ds:schemaRef ds:uri="http://schemas.microsoft.com/office/2006/documentManagement/types"/>
-    <ds:schemaRef ds:uri="http://purl.org/dc/dcmitype/"/>
-    <ds:schemaRef ds:uri="http://purl.org/dc/elements/1.1/"/>
-    <ds:schemaRef ds:uri="http://schemas.microsoft.com/office/infopath/2007/PartnerControls"/>
-    <ds:schemaRef ds:uri="http://schemas.openxmlformats.org/package/2006/metadata/core-properties"/>
-    <ds:schemaRef ds:uri="http://schemas.microsoft.com/office/2006/metadata/properties"/>
-  </ds:schemaRefs>
-</ds:datastoreItem>
+<file path=customXml/item2.xml><?xml version="1.0" encoding="utf-8"?>
+<?mso-contentType ?>
+<FormTemplates xmlns="http://schemas.microsoft.com/sharepoint/v3/contenttype/forms">
+  <Display>DocumentLibraryForm</Display>
+  <Edit>DocumentLibraryForm</Edit>
+  <New>DocumentLibraryForm</New>
+</FormTemplates>
 </file>
 
-<file path=customXml/itemProps2.xml><?xml version="1.0" encoding="utf-8"?>
-<ds:datastoreItem xmlns:ds="http://schemas.openxmlformats.org/officeDocument/2006/customXml" ds:itemID="{718918D8-6743-472F-9133-546308218B28}">
-  <ds:schemaRefs>
-    <ds:schemaRef ds:uri="http://schemas.microsoft.com/sharepoint/v3/contenttype/forms"/>
-  </ds:schemaRefs>
-</ds:datastoreItem>
+<file path=customXml/item3.xml><?xml version="1.0" encoding="utf-8"?>
+<p:properties xmlns:p="http://schemas.microsoft.com/office/2006/metadata/properties" xmlns:xsi="http://www.w3.org/2001/XMLSchema-instance" xmlns:pc="http://schemas.microsoft.com/office/infopath/2007/PartnerControls">
+  <documentManagement/>
+</p:properties>
 </file>
 
-<file path=customXml/itemProps3.xml><?xml version="1.0" encoding="utf-8"?>
+<file path=customXml/itemProps1.xml><?xml version="1.0" encoding="utf-8"?>
 <ds:datastoreItem xmlns:ds="http://schemas.openxmlformats.org/officeDocument/2006/customXml" ds:itemID="{D02B9EAD-A944-4E5C-83A5-95E3679ECDF3}">
   <ds:schemaRefs>
     <ds:schemaRef ds:uri="http://schemas.microsoft.com/office/2006/metadata/contentType"/>
@@ -9648,4 +9624,28 @@
     <ds:schemaRef ds:uri="http://schemas.microsoft.com/internal/obd"/>
   </ds:schemaRefs>
 </ds:datastoreItem>
+</file>
+
+<file path=customXml/itemProps2.xml><?xml version="1.0" encoding="utf-8"?>
+<ds:datastoreItem xmlns:ds="http://schemas.openxmlformats.org/officeDocument/2006/customXml" ds:itemID="{718918D8-6743-472F-9133-546308218B28}">
+  <ds:schemaRefs>
+    <ds:schemaRef ds:uri="http://schemas.microsoft.com/sharepoint/v3/contenttype/forms"/>
+  </ds:schemaRefs>
+</ds:datastoreItem>
+</file>
+
+<file path=customXml/itemProps3.xml><?xml version="1.0" encoding="utf-8"?>
+<ds:datastoreItem xmlns:ds="http://schemas.openxmlformats.org/officeDocument/2006/customXml" ds:itemID="{9FD3942E-F7FA-4AD8-9A69-5FDFB1F490D1}">
+  <ds:schemaRefs>
+    <ds:schemaRef ds:uri="http://purl.org/dc/terms/"/>
+    <ds:schemaRef ds:uri="http://www.w3.org/XML/1998/namespace"/>
+    <ds:schemaRef ds:uri="734a1c6a-53c2-48e7-a1cc-2e27d2845d4e"/>
+    <ds:schemaRef ds:uri="http://schemas.microsoft.com/office/2006/documentManagement/types"/>
+    <ds:schemaRef ds:uri="http://purl.org/dc/dcmitype/"/>
+    <ds:schemaRef ds:uri="http://purl.org/dc/elements/1.1/"/>
+    <ds:schemaRef ds:uri="http://schemas.microsoft.com/office/infopath/2007/PartnerControls"/>
+    <ds:schemaRef ds:uri="http://schemas.openxmlformats.org/package/2006/metadata/core-properties"/>
+    <ds:schemaRef ds:uri="http://schemas.microsoft.com/office/2006/metadata/properties"/>
+  </ds:schemaRefs>
+</ds:datastoreItem>
 </file>
</xml_diff>